<commit_message>
add 7, 8 ppt
</commit_message>
<xml_diff>
--- a/PPT/sulivan_public_template.pptx
+++ b/PPT/sulivan_public_template.pptx
@@ -9,8 +9,8 @@
   </p:notesMasterIdLst>
   <p:sldIdLst>
     <p:sldId id="284" r:id="rId2"/>
-    <p:sldId id="285" r:id="rId3"/>
-    <p:sldId id="286" r:id="rId4"/>
+    <p:sldId id="286" r:id="rId3"/>
+    <p:sldId id="285" r:id="rId4"/>
     <p:sldId id="287" r:id="rId5"/>
     <p:sldId id="288" r:id="rId6"/>
   </p:sldIdLst>
@@ -119,6 +119,10 @@
 </p:presentation>
 </file>
 
+<file path=ppt/revisionInfo.xml><?xml version="1.0" encoding="utf-8"?>
+<p1510:revInfo xmlns:a="http://schemas.openxmlformats.org/drawingml/2006/main" xmlns:r="http://schemas.openxmlformats.org/officeDocument/2006/relationships" xmlns:p1510="http://schemas.microsoft.com/office/powerpoint/2015/10/main"/>
+</file>
+
 <file path=ppt/notesMasters/notesMaster1.xml><?xml version="1.0" encoding="utf-8"?>
 <p:notesMaster xmlns:a="http://schemas.openxmlformats.org/drawingml/2006/main" xmlns:r="http://schemas.openxmlformats.org/officeDocument/2006/relationships" xmlns:p="http://schemas.openxmlformats.org/presentationml/2006/main">
   <p:cSld>
@@ -201,7 +205,7 @@
           <a:p>
             <a:fld id="{B8039FB8-6F18-436D-9454-D1944E32D5DF}" type="datetimeFigureOut">
               <a:rPr lang="ko-KR" altLang="en-US" smtClean="0"/>
-              <a:t>2017-12-20</a:t>
+              <a:t>2018-01-01</a:t>
             </a:fld>
             <a:endParaRPr lang="ko-KR" altLang="en-US"/>
           </a:p>
@@ -265,38 +269,37 @@
           <a:p>
             <a:pPr lvl="0"/>
             <a:r>
-              <a:rPr lang="ko-KR" altLang="en-US" smtClean="0"/>
+              <a:rPr lang="ko-KR" altLang="en-US"/>
               <a:t>마스터 텍스트 스타일 편집</a:t>
             </a:r>
           </a:p>
           <a:p>
             <a:pPr lvl="1"/>
             <a:r>
-              <a:rPr lang="ko-KR" altLang="en-US" smtClean="0"/>
+              <a:rPr lang="ko-KR" altLang="en-US"/>
               <a:t>둘째 수준</a:t>
             </a:r>
           </a:p>
           <a:p>
             <a:pPr lvl="2"/>
             <a:r>
-              <a:rPr lang="ko-KR" altLang="en-US" smtClean="0"/>
+              <a:rPr lang="ko-KR" altLang="en-US"/>
               <a:t>셋째 수준</a:t>
             </a:r>
           </a:p>
           <a:p>
             <a:pPr lvl="3"/>
             <a:r>
-              <a:rPr lang="ko-KR" altLang="en-US" smtClean="0"/>
+              <a:rPr lang="ko-KR" altLang="en-US"/>
               <a:t>넷째 수준</a:t>
             </a:r>
           </a:p>
           <a:p>
             <a:pPr lvl="4"/>
             <a:r>
-              <a:rPr lang="ko-KR" altLang="en-US" smtClean="0"/>
+              <a:rPr lang="ko-KR" altLang="en-US"/>
               <a:t>다섯째 수준</a:t>
             </a:r>
-            <a:endParaRPr lang="ko-KR" altLang="en-US"/>
           </a:p>
         </p:txBody>
       </p:sp>
@@ -511,10 +514,9 @@
           </a:lstStyle>
           <a:p>
             <a:r>
-              <a:rPr lang="ko-KR" altLang="en-US" smtClean="0"/>
+              <a:rPr lang="ko-KR" altLang="en-US"/>
               <a:t>마스터 제목 스타일 편집</a:t>
             </a:r>
-            <a:endParaRPr lang="ko-KR" altLang="en-US"/>
           </a:p>
         </p:txBody>
       </p:sp>
@@ -576,10 +578,9 @@
           </a:lstStyle>
           <a:p>
             <a:r>
-              <a:rPr lang="ko-KR" altLang="en-US" smtClean="0"/>
+              <a:rPr lang="ko-KR" altLang="en-US"/>
               <a:t>클릭하여 마스터 부제목 스타일 편집</a:t>
             </a:r>
-            <a:endParaRPr lang="ko-KR" altLang="en-US"/>
           </a:p>
         </p:txBody>
       </p:sp>
@@ -599,7 +600,7 @@
           <a:lstStyle/>
           <a:p>
             <a:r>
-              <a:rPr lang="en-US" altLang="ko-KR" smtClean="0"/>
+              <a:rPr lang="en-US" altLang="ko-KR"/>
               <a:t>2017</a:t>
             </a:r>
             <a:endParaRPr lang="ko-KR" altLang="en-US" dirty="0"/>
@@ -622,11 +623,11 @@
           <a:lstStyle/>
           <a:p>
             <a:r>
-              <a:rPr lang="en-US" altLang="ko-KR" smtClean="0"/>
+              <a:rPr lang="en-US" altLang="ko-KR"/>
               <a:t>C#</a:t>
             </a:r>
             <a:r>
-              <a:rPr lang="ko-KR" altLang="en-US" smtClean="0"/>
+              <a:rPr lang="ko-KR" altLang="en-US"/>
               <a:t>으로 클리커 게임 만들기</a:t>
             </a:r>
             <a:endParaRPr lang="ko-KR" altLang="en-US" dirty="0"/>
@@ -667,13 +668,6 @@
   <p:clrMapOvr>
     <a:masterClrMapping/>
   </p:clrMapOvr>
-  <p:timing>
-    <p:tnLst>
-      <p:par>
-        <p:cTn id="1" dur="indefinite" restart="never" nodeType="tmRoot"/>
-      </p:par>
-    </p:tnLst>
-  </p:timing>
   <p:hf hdr="0"/>
 </p:sldLayout>
 </file>
@@ -711,21 +705,94 @@
           <a:lstStyle/>
           <a:p>
             <a:r>
-              <a:rPr lang="ko-KR" altLang="en-US" smtClean="0"/>
+              <a:rPr lang="ko-KR" altLang="en-US"/>
               <a:t>마스터 제목 스타일 편집</a:t>
             </a:r>
+          </a:p>
+        </p:txBody>
+      </p:sp>
+      <p:sp>
+        <p:nvSpPr>
+          <p:cNvPr id="3" name="내용 개체 틀 2"/>
+          <p:cNvSpPr>
+            <a:spLocks noGrp="1"/>
+          </p:cNvSpPr>
+          <p:nvPr>
+            <p:ph idx="1"/>
+          </p:nvPr>
+        </p:nvSpPr>
+        <p:spPr/>
+        <p:txBody>
+          <a:bodyPr/>
+          <a:lstStyle/>
+          <a:p>
+            <a:pPr lvl="0"/>
+            <a:r>
+              <a:rPr lang="ko-KR" altLang="en-US"/>
+              <a:t>마스터 텍스트 스타일 편집</a:t>
+            </a:r>
+          </a:p>
+          <a:p>
+            <a:pPr lvl="1"/>
+            <a:r>
+              <a:rPr lang="ko-KR" altLang="en-US"/>
+              <a:t>둘째 수준</a:t>
+            </a:r>
+          </a:p>
+          <a:p>
+            <a:pPr lvl="2"/>
+            <a:r>
+              <a:rPr lang="ko-KR" altLang="en-US"/>
+              <a:t>셋째 수준</a:t>
+            </a:r>
+          </a:p>
+          <a:p>
+            <a:pPr lvl="3"/>
+            <a:r>
+              <a:rPr lang="ko-KR" altLang="en-US"/>
+              <a:t>넷째 수준</a:t>
+            </a:r>
+          </a:p>
+          <a:p>
+            <a:pPr lvl="4"/>
+            <a:r>
+              <a:rPr lang="ko-KR" altLang="en-US"/>
+              <a:t>다섯째 수준</a:t>
+            </a:r>
+          </a:p>
+        </p:txBody>
+      </p:sp>
+      <p:sp>
+        <p:nvSpPr>
+          <p:cNvPr id="4" name="날짜 개체 틀 3"/>
+          <p:cNvSpPr>
+            <a:spLocks noGrp="1"/>
+          </p:cNvSpPr>
+          <p:nvPr>
+            <p:ph type="dt" sz="half" idx="10"/>
+          </p:nvPr>
+        </p:nvSpPr>
+        <p:spPr/>
+        <p:txBody>
+          <a:bodyPr/>
+          <a:lstStyle/>
+          <a:p>
+            <a:r>
+              <a:rPr lang="en-US" altLang="ko-KR"/>
+              <a:t>2017</a:t>
+            </a:r>
             <a:endParaRPr lang="ko-KR" altLang="en-US"/>
           </a:p>
         </p:txBody>
       </p:sp>
       <p:sp>
         <p:nvSpPr>
-          <p:cNvPr id="3" name="내용 개체 틀 2"/>
-          <p:cNvSpPr>
-            <a:spLocks noGrp="1"/>
-          </p:cNvSpPr>
-          <p:nvPr>
-            <p:ph idx="1"/>
+          <p:cNvPr id="5" name="바닥글 개체 틀 4"/>
+          <p:cNvSpPr>
+            <a:spLocks noGrp="1"/>
+          </p:cNvSpPr>
+          <p:nvPr>
+            <p:ph type="ftr" sz="quarter" idx="11"/>
           </p:nvPr>
         </p:nvSpPr>
         <p:spPr/>
@@ -733,87 +800,12 @@
           <a:bodyPr/>
           <a:lstStyle/>
           <a:p>
-            <a:pPr lvl="0"/>
-            <a:r>
-              <a:rPr lang="ko-KR" altLang="en-US" smtClean="0"/>
-              <a:t>마스터 텍스트 스타일 편집</a:t>
-            </a:r>
-          </a:p>
-          <a:p>
-            <a:pPr lvl="1"/>
-            <a:r>
-              <a:rPr lang="ko-KR" altLang="en-US" smtClean="0"/>
-              <a:t>둘째 수준</a:t>
-            </a:r>
-          </a:p>
-          <a:p>
-            <a:pPr lvl="2"/>
-            <a:r>
-              <a:rPr lang="ko-KR" altLang="en-US" smtClean="0"/>
-              <a:t>셋째 수준</a:t>
-            </a:r>
-          </a:p>
-          <a:p>
-            <a:pPr lvl="3"/>
-            <a:r>
-              <a:rPr lang="ko-KR" altLang="en-US" smtClean="0"/>
-              <a:t>넷째 수준</a:t>
-            </a:r>
-          </a:p>
-          <a:p>
-            <a:pPr lvl="4"/>
-            <a:r>
-              <a:rPr lang="ko-KR" altLang="en-US" smtClean="0"/>
-              <a:t>다섯째 수준</a:t>
-            </a:r>
-            <a:endParaRPr lang="ko-KR" altLang="en-US"/>
-          </a:p>
-        </p:txBody>
-      </p:sp>
-      <p:sp>
-        <p:nvSpPr>
-          <p:cNvPr id="4" name="날짜 개체 틀 3"/>
-          <p:cNvSpPr>
-            <a:spLocks noGrp="1"/>
-          </p:cNvSpPr>
-          <p:nvPr>
-            <p:ph type="dt" sz="half" idx="10"/>
-          </p:nvPr>
-        </p:nvSpPr>
-        <p:spPr/>
-        <p:txBody>
-          <a:bodyPr/>
-          <a:lstStyle/>
-          <a:p>
-            <a:r>
-              <a:rPr lang="en-US" altLang="ko-KR" smtClean="0"/>
-              <a:t>2017</a:t>
-            </a:r>
-            <a:endParaRPr lang="ko-KR" altLang="en-US"/>
-          </a:p>
-        </p:txBody>
-      </p:sp>
-      <p:sp>
-        <p:nvSpPr>
-          <p:cNvPr id="5" name="바닥글 개체 틀 4"/>
-          <p:cNvSpPr>
-            <a:spLocks noGrp="1"/>
-          </p:cNvSpPr>
-          <p:nvPr>
-            <p:ph type="ftr" sz="quarter" idx="11"/>
-          </p:nvPr>
-        </p:nvSpPr>
-        <p:spPr/>
-        <p:txBody>
-          <a:bodyPr/>
-          <a:lstStyle/>
-          <a:p>
-            <a:r>
-              <a:rPr lang="en-US" altLang="ko-KR" smtClean="0"/>
+            <a:r>
+              <a:rPr lang="en-US" altLang="ko-KR"/>
               <a:t>C#</a:t>
             </a:r>
             <a:r>
-              <a:rPr lang="ko-KR" altLang="en-US" smtClean="0"/>
+              <a:rPr lang="ko-KR" altLang="en-US"/>
               <a:t>으로 클리커 게임 만들기</a:t>
             </a:r>
             <a:endParaRPr lang="ko-KR" altLang="en-US" dirty="0"/>
@@ -879,13 +871,6 @@
   <p:transition>
     <p:push dir="u"/>
   </p:transition>
-  <p:timing>
-    <p:tnLst>
-      <p:par>
-        <p:cTn id="1" dur="indefinite" restart="never" nodeType="tmRoot"/>
-      </p:par>
-    </p:tnLst>
-  </p:timing>
 </p:sldLayout>
 </file>
 
@@ -922,10 +907,9 @@
           <a:lstStyle/>
           <a:p>
             <a:r>
-              <a:rPr lang="ko-KR" altLang="en-US" smtClean="0"/>
+              <a:rPr lang="ko-KR" altLang="en-US"/>
               <a:t>마스터 제목 스타일 편집</a:t>
             </a:r>
-            <a:endParaRPr lang="ko-KR" altLang="en-US"/>
           </a:p>
         </p:txBody>
       </p:sp>
@@ -951,38 +935,37 @@
           <a:p>
             <a:pPr lvl="0"/>
             <a:r>
-              <a:rPr lang="ko-KR" altLang="en-US" smtClean="0"/>
+              <a:rPr lang="ko-KR" altLang="en-US"/>
               <a:t>마스터 텍스트 스타일 편집</a:t>
             </a:r>
           </a:p>
           <a:p>
             <a:pPr lvl="1"/>
             <a:r>
-              <a:rPr lang="ko-KR" altLang="en-US" smtClean="0"/>
+              <a:rPr lang="ko-KR" altLang="en-US"/>
               <a:t>둘째 수준</a:t>
             </a:r>
           </a:p>
           <a:p>
             <a:pPr lvl="2"/>
             <a:r>
-              <a:rPr lang="ko-KR" altLang="en-US" smtClean="0"/>
+              <a:rPr lang="ko-KR" altLang="en-US"/>
               <a:t>셋째 수준</a:t>
             </a:r>
           </a:p>
           <a:p>
             <a:pPr lvl="3"/>
             <a:r>
-              <a:rPr lang="ko-KR" altLang="en-US" smtClean="0"/>
+              <a:rPr lang="ko-KR" altLang="en-US"/>
               <a:t>넷째 수준</a:t>
             </a:r>
           </a:p>
           <a:p>
             <a:pPr lvl="4"/>
             <a:r>
-              <a:rPr lang="ko-KR" altLang="en-US" smtClean="0"/>
+              <a:rPr lang="ko-KR" altLang="en-US"/>
               <a:t>다섯째 수준</a:t>
             </a:r>
-            <a:endParaRPr lang="ko-KR" altLang="en-US"/>
           </a:p>
         </p:txBody>
       </p:sp>
@@ -1008,49 +991,71 @@
           <a:p>
             <a:pPr lvl="0"/>
             <a:r>
-              <a:rPr lang="ko-KR" altLang="en-US" smtClean="0"/>
+              <a:rPr lang="ko-KR" altLang="en-US"/>
               <a:t>마스터 텍스트 스타일 편집</a:t>
             </a:r>
           </a:p>
           <a:p>
             <a:pPr lvl="1"/>
             <a:r>
-              <a:rPr lang="ko-KR" altLang="en-US" smtClean="0"/>
+              <a:rPr lang="ko-KR" altLang="en-US"/>
               <a:t>둘째 수준</a:t>
             </a:r>
           </a:p>
           <a:p>
             <a:pPr lvl="2"/>
             <a:r>
-              <a:rPr lang="ko-KR" altLang="en-US" smtClean="0"/>
+              <a:rPr lang="ko-KR" altLang="en-US"/>
               <a:t>셋째 수준</a:t>
             </a:r>
           </a:p>
           <a:p>
             <a:pPr lvl="3"/>
             <a:r>
-              <a:rPr lang="ko-KR" altLang="en-US" smtClean="0"/>
+              <a:rPr lang="ko-KR" altLang="en-US"/>
               <a:t>넷째 수준</a:t>
             </a:r>
           </a:p>
           <a:p>
             <a:pPr lvl="4"/>
             <a:r>
-              <a:rPr lang="ko-KR" altLang="en-US" smtClean="0"/>
+              <a:rPr lang="ko-KR" altLang="en-US"/>
               <a:t>다섯째 수준</a:t>
             </a:r>
+          </a:p>
+        </p:txBody>
+      </p:sp>
+      <p:sp>
+        <p:nvSpPr>
+          <p:cNvPr id="5" name="날짜 개체 틀 4"/>
+          <p:cNvSpPr>
+            <a:spLocks noGrp="1"/>
+          </p:cNvSpPr>
+          <p:nvPr>
+            <p:ph type="dt" sz="half" idx="10"/>
+          </p:nvPr>
+        </p:nvSpPr>
+        <p:spPr/>
+        <p:txBody>
+          <a:bodyPr/>
+          <a:lstStyle/>
+          <a:p>
+            <a:r>
+              <a:rPr lang="en-US" altLang="ko-KR"/>
+              <a:t>2017</a:t>
+            </a:r>
             <a:endParaRPr lang="ko-KR" altLang="en-US"/>
           </a:p>
         </p:txBody>
       </p:sp>
       <p:sp>
         <p:nvSpPr>
-          <p:cNvPr id="5" name="날짜 개체 틀 4"/>
-          <p:cNvSpPr>
-            <a:spLocks noGrp="1"/>
-          </p:cNvSpPr>
-          <p:nvPr>
-            <p:ph type="dt" sz="half" idx="10"/>
+          <p:cNvPr id="6" name="바닥글 개체 틀 5"/>
+          <p:cNvSpPr>
+            <a:spLocks noGrp="1"/>
+          </p:cNvSpPr>
+          <p:nvPr>
+            <p:ph type="ftr" sz="quarter" idx="11"/>
           </p:nvPr>
         </p:nvSpPr>
         <p:spPr/>
@@ -1059,37 +1064,13 @@
           <a:lstStyle/>
           <a:p>
             <a:r>
-              <a:rPr lang="en-US" altLang="ko-KR" smtClean="0"/>
-              <a:t>2017</a:t>
-            </a:r>
-            <a:endParaRPr lang="ko-KR" altLang="en-US"/>
-          </a:p>
-        </p:txBody>
-      </p:sp>
-      <p:sp>
-        <p:nvSpPr>
-          <p:cNvPr id="6" name="바닥글 개체 틀 5"/>
-          <p:cNvSpPr>
-            <a:spLocks noGrp="1"/>
-          </p:cNvSpPr>
-          <p:nvPr>
-            <p:ph type="ftr" sz="quarter" idx="11"/>
-          </p:nvPr>
-        </p:nvSpPr>
-        <p:spPr/>
-        <p:txBody>
-          <a:bodyPr/>
-          <a:lstStyle/>
-          <a:p>
-            <a:r>
-              <a:rPr lang="en-US" altLang="ko-KR" smtClean="0"/>
+              <a:rPr lang="en-US" altLang="ko-KR"/>
               <a:t>C#</a:t>
             </a:r>
             <a:r>
-              <a:rPr lang="ko-KR" altLang="en-US" smtClean="0"/>
+              <a:rPr lang="ko-KR" altLang="en-US"/>
               <a:t>으로 클리커 게임 만들기</a:t>
             </a:r>
-            <a:endParaRPr lang="ko-KR" altLang="en-US"/>
           </a:p>
         </p:txBody>
       </p:sp>
@@ -1149,13 +1130,6 @@
   <p:clrMapOvr>
     <a:masterClrMapping/>
   </p:clrMapOvr>
-  <p:timing>
-    <p:tnLst>
-      <p:par>
-        <p:cTn id="1" dur="indefinite" restart="never" nodeType="tmRoot"/>
-      </p:par>
-    </p:tnLst>
-  </p:timing>
 </p:sldLayout>
 </file>
 
@@ -1201,10 +1175,9 @@
           </a:lstStyle>
           <a:p>
             <a:r>
-              <a:rPr lang="ko-KR" altLang="en-US" smtClean="0"/>
+              <a:rPr lang="ko-KR" altLang="en-US"/>
               <a:t>마스터 제목 스타일 편집</a:t>
             </a:r>
-            <a:endParaRPr lang="ko-KR" altLang="en-US"/>
           </a:p>
         </p:txBody>
       </p:sp>
@@ -1258,38 +1231,37 @@
           <a:p>
             <a:pPr lvl="0"/>
             <a:r>
-              <a:rPr lang="ko-KR" altLang="en-US" smtClean="0"/>
+              <a:rPr lang="ko-KR" altLang="en-US"/>
               <a:t>마스터 텍스트 스타일 편집</a:t>
             </a:r>
           </a:p>
           <a:p>
             <a:pPr lvl="1"/>
             <a:r>
-              <a:rPr lang="ko-KR" altLang="en-US" smtClean="0"/>
+              <a:rPr lang="ko-KR" altLang="en-US"/>
               <a:t>둘째 수준</a:t>
             </a:r>
           </a:p>
           <a:p>
             <a:pPr lvl="2"/>
             <a:r>
-              <a:rPr lang="ko-KR" altLang="en-US" smtClean="0"/>
+              <a:rPr lang="ko-KR" altLang="en-US"/>
               <a:t>셋째 수준</a:t>
             </a:r>
           </a:p>
           <a:p>
             <a:pPr lvl="3"/>
             <a:r>
-              <a:rPr lang="ko-KR" altLang="en-US" smtClean="0"/>
+              <a:rPr lang="ko-KR" altLang="en-US"/>
               <a:t>넷째 수준</a:t>
             </a:r>
           </a:p>
           <a:p>
             <a:pPr lvl="4"/>
             <a:r>
-              <a:rPr lang="ko-KR" altLang="en-US" smtClean="0"/>
+              <a:rPr lang="ko-KR" altLang="en-US"/>
               <a:t>다섯째 수준</a:t>
             </a:r>
-            <a:endParaRPr lang="ko-KR" altLang="en-US"/>
           </a:p>
         </p:txBody>
       </p:sp>
@@ -1352,7 +1324,7 @@
           <a:p>
             <a:pPr lvl="0"/>
             <a:r>
-              <a:rPr lang="ko-KR" altLang="en-US" smtClean="0"/>
+              <a:rPr lang="ko-KR" altLang="en-US"/>
               <a:t>마스터 텍스트 스타일 편집</a:t>
             </a:r>
           </a:p>
@@ -1374,7 +1346,7 @@
           <a:lstStyle/>
           <a:p>
             <a:r>
-              <a:rPr lang="en-US" altLang="ko-KR" smtClean="0"/>
+              <a:rPr lang="en-US" altLang="ko-KR"/>
               <a:t>2017</a:t>
             </a:r>
             <a:endParaRPr lang="ko-KR" altLang="en-US"/>
@@ -1397,14 +1369,13 @@
           <a:lstStyle/>
           <a:p>
             <a:r>
-              <a:rPr lang="en-US" altLang="ko-KR" smtClean="0"/>
+              <a:rPr lang="en-US" altLang="ko-KR"/>
               <a:t>C#</a:t>
             </a:r>
             <a:r>
-              <a:rPr lang="ko-KR" altLang="en-US" smtClean="0"/>
+              <a:rPr lang="ko-KR" altLang="en-US"/>
               <a:t>으로 클리커 게임 만들기</a:t>
             </a:r>
-            <a:endParaRPr lang="ko-KR" altLang="en-US"/>
           </a:p>
         </p:txBody>
       </p:sp>
@@ -1464,13 +1435,6 @@
   <p:clrMapOvr>
     <a:masterClrMapping/>
   </p:clrMapOvr>
-  <p:timing>
-    <p:tnLst>
-      <p:par>
-        <p:cTn id="1" dur="indefinite" restart="never" nodeType="tmRoot"/>
-      </p:par>
-    </p:tnLst>
-  </p:timing>
 </p:sldLayout>
 </file>
 
@@ -1573,7 +1537,7 @@
           </a:lstStyle>
           <a:p>
             <a:r>
-              <a:rPr lang="ko-KR" altLang="en-US" smtClean="0"/>
+              <a:rPr lang="ko-KR" altLang="en-US"/>
               <a:t>주제</a:t>
             </a:r>
             <a:endParaRPr lang="ko-KR" altLang="en-US" dirty="0"/>
@@ -1596,7 +1560,7 @@
           <a:lstStyle/>
           <a:p>
             <a:r>
-              <a:rPr lang="en-US" altLang="ko-KR" smtClean="0"/>
+              <a:rPr lang="en-US" altLang="ko-KR"/>
               <a:t>2017</a:t>
             </a:r>
             <a:endParaRPr lang="ko-KR" altLang="en-US" dirty="0"/>
@@ -1619,11 +1583,11 @@
           <a:lstStyle/>
           <a:p>
             <a:r>
-              <a:rPr lang="en-US" altLang="ko-KR" smtClean="0"/>
+              <a:rPr lang="en-US" altLang="ko-KR"/>
               <a:t>C#</a:t>
             </a:r>
             <a:r>
-              <a:rPr lang="ko-KR" altLang="en-US" smtClean="0"/>
+              <a:rPr lang="ko-KR" altLang="en-US"/>
               <a:t>으로 클리커 게임 만들기</a:t>
             </a:r>
             <a:endParaRPr lang="ko-KR" altLang="en-US" dirty="0"/>
@@ -1715,7 +1679,7 @@
           <a:p>
             <a:pPr lvl="0"/>
             <a:r>
-              <a:rPr lang="ko-KR" altLang="en-US" dirty="0" err="1" smtClean="0"/>
+              <a:rPr lang="ko-KR" altLang="en-US" dirty="0" err="1"/>
               <a:t>부주제</a:t>
             </a:r>
             <a:endParaRPr lang="ko-KR" altLang="en-US" dirty="0"/>
@@ -1732,13 +1696,6 @@
   <p:clrMapOvr>
     <a:masterClrMapping/>
   </p:clrMapOvr>
-  <p:timing>
-    <p:tnLst>
-      <p:par>
-        <p:cTn id="1" dur="indefinite" restart="never" nodeType="tmRoot"/>
-      </p:par>
-    </p:tnLst>
-  </p:timing>
 </p:sldLayout>
 </file>
 
@@ -1871,7 +1828,7 @@
           <a:lstStyle/>
           <a:p>
             <a:r>
-              <a:rPr lang="en-US" altLang="ko-KR" smtClean="0"/>
+              <a:rPr lang="en-US" altLang="ko-KR"/>
               <a:t>2017</a:t>
             </a:r>
             <a:endParaRPr lang="ko-KR" altLang="en-US" dirty="0"/>
@@ -1894,11 +1851,11 @@
           <a:lstStyle/>
           <a:p>
             <a:r>
-              <a:rPr lang="en-US" altLang="ko-KR" smtClean="0"/>
+              <a:rPr lang="en-US" altLang="ko-KR"/>
               <a:t>C#</a:t>
             </a:r>
             <a:r>
-              <a:rPr lang="ko-KR" altLang="en-US" smtClean="0"/>
+              <a:rPr lang="ko-KR" altLang="en-US"/>
               <a:t>으로 클리커 게임 만들기</a:t>
             </a:r>
             <a:endParaRPr lang="ko-KR" altLang="en-US" dirty="0"/>
@@ -1969,13 +1926,6 @@
   <p:clrMapOvr>
     <a:masterClrMapping/>
   </p:clrMapOvr>
-  <p:timing>
-    <p:tnLst>
-      <p:par>
-        <p:cTn id="1" dur="indefinite" restart="never" nodeType="tmRoot"/>
-      </p:par>
-    </p:tnLst>
-  </p:timing>
 </p:sldLayout>
 </file>
 
@@ -2083,7 +2033,7 @@
           </a:lstStyle>
           <a:p>
             <a:r>
-              <a:rPr lang="en-US" altLang="ko-KR" smtClean="0"/>
+              <a:rPr lang="en-US" altLang="ko-KR"/>
               <a:t>2017</a:t>
             </a:r>
             <a:endParaRPr lang="ko-KR" altLang="en-US" dirty="0"/>
@@ -2114,22 +2064,21 @@
           </a:lstStyle>
           <a:p>
             <a:r>
-              <a:rPr lang="en-US" altLang="ko-KR" dirty="0" smtClean="0"/>
+              <a:rPr lang="en-US" altLang="ko-KR" dirty="0"/>
               <a:t>C#</a:t>
             </a:r>
             <a:r>
-              <a:rPr lang="ko-KR" altLang="en-US" dirty="0" smtClean="0"/>
+              <a:rPr lang="ko-KR" altLang="en-US" dirty="0"/>
               <a:t>으로 </a:t>
             </a:r>
             <a:r>
-              <a:rPr lang="ko-KR" altLang="en-US" dirty="0" err="1" smtClean="0"/>
+              <a:rPr lang="ko-KR" altLang="en-US" dirty="0" err="1"/>
               <a:t>클리커</a:t>
             </a:r>
             <a:r>
-              <a:rPr lang="ko-KR" altLang="en-US" dirty="0" smtClean="0"/>
+              <a:rPr lang="ko-KR" altLang="en-US" dirty="0"/>
               <a:t> 게임 만들기</a:t>
             </a:r>
-            <a:endParaRPr lang="ko-KR" altLang="en-US" dirty="0"/>
           </a:p>
         </p:txBody>
       </p:sp>
@@ -2232,7 +2181,7 @@
           </a:lstStyle>
           <a:p>
             <a:r>
-              <a:rPr lang="ko-KR" altLang="en-US" sz="4400" baseline="0" dirty="0" smtClean="0">
+              <a:rPr lang="ko-KR" altLang="en-US" sz="4400" baseline="0" dirty="0">
                 <a:solidFill>
                   <a:schemeClr val="tx1">
                     <a:lumMod val="75000"/>
@@ -2308,38 +2257,37 @@
           <a:p>
             <a:pPr lvl="0"/>
             <a:r>
-              <a:rPr lang="ko-KR" altLang="en-US" dirty="0" smtClean="0"/>
+              <a:rPr lang="ko-KR" altLang="en-US" dirty="0"/>
               <a:t>마스터 텍스트 스타일 편집</a:t>
             </a:r>
           </a:p>
           <a:p>
             <a:pPr lvl="1"/>
             <a:r>
-              <a:rPr lang="ko-KR" altLang="en-US" dirty="0" smtClean="0"/>
+              <a:rPr lang="ko-KR" altLang="en-US" dirty="0"/>
               <a:t>둘째 수준</a:t>
             </a:r>
           </a:p>
           <a:p>
             <a:pPr lvl="2"/>
             <a:r>
-              <a:rPr lang="ko-KR" altLang="en-US" dirty="0" smtClean="0"/>
+              <a:rPr lang="ko-KR" altLang="en-US" dirty="0"/>
               <a:t>셋째 수준</a:t>
             </a:r>
           </a:p>
           <a:p>
             <a:pPr lvl="3"/>
             <a:r>
-              <a:rPr lang="ko-KR" altLang="en-US" dirty="0" smtClean="0"/>
+              <a:rPr lang="ko-KR" altLang="en-US" dirty="0"/>
               <a:t>넷째 수준</a:t>
             </a:r>
           </a:p>
           <a:p>
             <a:pPr lvl="4"/>
             <a:r>
-              <a:rPr lang="ko-KR" altLang="en-US" dirty="0" smtClean="0"/>
+              <a:rPr lang="ko-KR" altLang="en-US" dirty="0"/>
               <a:t>다섯째 수준</a:t>
             </a:r>
-            <a:endParaRPr lang="ko-KR" altLang="en-US" dirty="0"/>
           </a:p>
         </p:txBody>
       </p:sp>
@@ -2353,13 +2301,6 @@
   <p:clrMapOvr>
     <a:masterClrMapping/>
   </p:clrMapOvr>
-  <p:timing>
-    <p:tnLst>
-      <p:par>
-        <p:cTn id="1" dur="indefinite" restart="never" nodeType="tmRoot"/>
-      </p:par>
-    </p:tnLst>
-  </p:timing>
 </p:sldLayout>
 </file>
 
@@ -2420,13 +2361,6 @@
   <p:clrMapOvr>
     <a:masterClrMapping/>
   </p:clrMapOvr>
-  <p:timing>
-    <p:tnLst>
-      <p:par>
-        <p:cTn id="1" dur="indefinite" restart="never" nodeType="tmRoot"/>
-      </p:par>
-    </p:tnLst>
-  </p:timing>
 </p:sldLayout>
 </file>
 
@@ -2526,7 +2460,7 @@
           </a:lstStyle>
           <a:p>
             <a:r>
-              <a:rPr lang="en-US" altLang="ko-KR" smtClean="0"/>
+              <a:rPr lang="en-US" altLang="ko-KR"/>
               <a:t>2017</a:t>
             </a:r>
             <a:endParaRPr lang="ko-KR" altLang="en-US" dirty="0"/>
@@ -2557,11 +2491,11 @@
           </a:lstStyle>
           <a:p>
             <a:r>
-              <a:rPr lang="en-US" altLang="ko-KR" smtClean="0"/>
+              <a:rPr lang="en-US" altLang="ko-KR"/>
               <a:t>C#</a:t>
             </a:r>
             <a:r>
-              <a:rPr lang="ko-KR" altLang="en-US" smtClean="0"/>
+              <a:rPr lang="ko-KR" altLang="en-US"/>
               <a:t>으로 클리커 게임 만들기</a:t>
             </a:r>
             <a:endParaRPr lang="ko-KR" altLang="en-US" dirty="0"/>
@@ -2631,26 +2565,25 @@
           <a:p>
             <a:pPr lvl="0"/>
             <a:r>
-              <a:rPr lang="ko-KR" altLang="en-US" dirty="0" smtClean="0"/>
+              <a:rPr lang="ko-KR" altLang="en-US" dirty="0"/>
               <a:t>문진호</a:t>
             </a:r>
             <a:r>
-              <a:rPr lang="en-US" altLang="ko-KR" dirty="0" smtClean="0"/>
+              <a:rPr lang="en-US" altLang="ko-KR" dirty="0"/>
               <a:t>, </a:t>
             </a:r>
             <a:r>
-              <a:rPr lang="ko-KR" altLang="en-US" dirty="0" err="1" smtClean="0"/>
+              <a:rPr lang="ko-KR" altLang="en-US" dirty="0" err="1"/>
               <a:t>임재민</a:t>
             </a:r>
             <a:r>
-              <a:rPr lang="en-US" altLang="ko-KR" dirty="0" smtClean="0"/>
+              <a:rPr lang="en-US" altLang="ko-KR" dirty="0"/>
               <a:t>, </a:t>
             </a:r>
             <a:r>
-              <a:rPr lang="ko-KR" altLang="en-US" dirty="0" smtClean="0"/>
+              <a:rPr lang="ko-KR" altLang="en-US" dirty="0"/>
               <a:t>연준모</a:t>
             </a:r>
-            <a:endParaRPr lang="ko-KR" altLang="en-US" dirty="0"/>
           </a:p>
         </p:txBody>
       </p:sp>
@@ -2725,19 +2658,19 @@
               <a:buNone/>
             </a:pPr>
             <a:r>
-              <a:rPr lang="en-US" altLang="ko-KR" sz="4400" dirty="0" smtClean="0"/>
+              <a:rPr lang="en-US" altLang="ko-KR" sz="4400" dirty="0"/>
               <a:t>N</a:t>
             </a:r>
             <a:r>
-              <a:rPr lang="ko-KR" altLang="en-US" sz="4400" dirty="0" smtClean="0"/>
+              <a:rPr lang="ko-KR" altLang="en-US" sz="4400" dirty="0"/>
               <a:t>강 </a:t>
             </a:r>
             <a:r>
-              <a:rPr lang="en-US" altLang="ko-KR" sz="4400" dirty="0" smtClean="0"/>
+              <a:rPr lang="en-US" altLang="ko-KR" sz="4400" dirty="0"/>
               <a:t>– </a:t>
             </a:r>
             <a:r>
-              <a:rPr lang="ko-KR" altLang="en-US" sz="4400" dirty="0" err="1" smtClean="0"/>
+              <a:rPr lang="ko-KR" altLang="en-US" sz="4400" dirty="0" err="1"/>
               <a:t>강의명</a:t>
             </a:r>
             <a:endParaRPr lang="ko-KR" altLang="en-US" sz="4400" dirty="0"/>
@@ -2754,13 +2687,6 @@
   <p:clrMapOvr>
     <a:masterClrMapping/>
   </p:clrMapOvr>
-  <p:timing>
-    <p:tnLst>
-      <p:par>
-        <p:cTn id="1" dur="indefinite" restart="never" nodeType="tmRoot"/>
-      </p:par>
-    </p:tnLst>
-  </p:timing>
 </p:sldLayout>
 </file>
 
@@ -2812,10 +2738,9 @@
           <a:lstStyle/>
           <a:p>
             <a:r>
-              <a:rPr lang="ko-KR" altLang="en-US" smtClean="0"/>
+              <a:rPr lang="ko-KR" altLang="en-US"/>
               <a:t>마스터 제목 스타일 편집</a:t>
             </a:r>
-            <a:endParaRPr lang="ko-KR" altLang="en-US"/>
           </a:p>
         </p:txBody>
       </p:sp>
@@ -2846,38 +2771,37 @@
           <a:p>
             <a:pPr lvl="0"/>
             <a:r>
-              <a:rPr lang="ko-KR" altLang="en-US" dirty="0" smtClean="0"/>
+              <a:rPr lang="ko-KR" altLang="en-US" dirty="0"/>
               <a:t>마스터 텍스트 스타일 편집</a:t>
             </a:r>
           </a:p>
           <a:p>
             <a:pPr lvl="1"/>
             <a:r>
-              <a:rPr lang="ko-KR" altLang="en-US" dirty="0" smtClean="0"/>
+              <a:rPr lang="ko-KR" altLang="en-US" dirty="0"/>
               <a:t>둘째 수준</a:t>
             </a:r>
           </a:p>
           <a:p>
             <a:pPr lvl="2"/>
             <a:r>
-              <a:rPr lang="ko-KR" altLang="en-US" dirty="0" smtClean="0"/>
+              <a:rPr lang="ko-KR" altLang="en-US" dirty="0"/>
               <a:t>셋째 수준</a:t>
             </a:r>
           </a:p>
           <a:p>
             <a:pPr lvl="3"/>
             <a:r>
-              <a:rPr lang="ko-KR" altLang="en-US" dirty="0" smtClean="0"/>
+              <a:rPr lang="ko-KR" altLang="en-US" dirty="0"/>
               <a:t>넷째 수준</a:t>
             </a:r>
           </a:p>
           <a:p>
             <a:pPr lvl="4"/>
             <a:r>
-              <a:rPr lang="ko-KR" altLang="en-US" dirty="0" smtClean="0"/>
+              <a:rPr lang="ko-KR" altLang="en-US" dirty="0"/>
               <a:t>다섯째 수준</a:t>
             </a:r>
-            <a:endParaRPr lang="ko-KR" altLang="en-US" dirty="0"/>
           </a:p>
         </p:txBody>
       </p:sp>
@@ -2915,7 +2839,7 @@
           </a:lstStyle>
           <a:p>
             <a:r>
-              <a:rPr lang="en-US" altLang="ko-KR" smtClean="0"/>
+              <a:rPr lang="en-US" altLang="ko-KR"/>
               <a:t>2017</a:t>
             </a:r>
             <a:endParaRPr lang="ko-KR" altLang="en-US" dirty="0"/>
@@ -2956,11 +2880,11 @@
           </a:lstStyle>
           <a:p>
             <a:r>
-              <a:rPr lang="en-US" altLang="ko-KR" smtClean="0"/>
+              <a:rPr lang="en-US" altLang="ko-KR"/>
               <a:t>C#</a:t>
             </a:r>
             <a:r>
-              <a:rPr lang="ko-KR" altLang="en-US" smtClean="0"/>
+              <a:rPr lang="ko-KR" altLang="en-US"/>
               <a:t>으로 클리커 게임 만들기</a:t>
             </a:r>
             <a:endParaRPr lang="ko-KR" altLang="en-US" dirty="0"/>
@@ -3063,13 +2987,6 @@
     <p:sldLayoutId id="2147483695" r:id="rId8"/>
     <p:sldLayoutId id="2147483696" r:id="rId9"/>
   </p:sldLayoutIdLst>
-  <p:timing>
-    <p:tnLst>
-      <p:par>
-        <p:cTn id="1" dur="indefinite" restart="never" nodeType="tmRoot"/>
-      </p:par>
-    </p:tnLst>
-  </p:timing>
   <p:hf hdr="0"/>
   <p:txStyles>
     <p:titleStyle>
@@ -3392,7 +3309,7 @@
           <a:lstStyle/>
           <a:p>
             <a:r>
-              <a:rPr lang="en-US" altLang="ko-KR" smtClean="0"/>
+              <a:rPr lang="en-US" altLang="ko-KR"/>
               <a:t>2017</a:t>
             </a:r>
             <a:endParaRPr lang="ko-KR" altLang="en-US" dirty="0"/>
@@ -3420,11 +3337,11 @@
           <a:lstStyle/>
           <a:p>
             <a:r>
-              <a:rPr lang="en-US" altLang="ko-KR" smtClean="0"/>
+              <a:rPr lang="en-US" altLang="ko-KR"/>
               <a:t>C#</a:t>
             </a:r>
             <a:r>
-              <a:rPr lang="ko-KR" altLang="en-US" smtClean="0"/>
+              <a:rPr lang="ko-KR" altLang="en-US"/>
               <a:t>으로 클리커 게임 만들기</a:t>
             </a:r>
             <a:endParaRPr lang="ko-KR" altLang="en-US" dirty="0"/>
@@ -3470,13 +3387,6 @@
   <p:clrMapOvr>
     <a:masterClrMapping/>
   </p:clrMapOvr>
-  <p:timing>
-    <p:tnLst>
-      <p:par>
-        <p:cTn id="1" dur="indefinite" restart="never" nodeType="tmRoot"/>
-      </p:par>
-    </p:tnLst>
-  </p:timing>
 </p:sld>
 </file>
 
@@ -3499,6 +3409,25 @@
       </p:grpSpPr>
       <p:sp>
         <p:nvSpPr>
+          <p:cNvPr id="7" name="제목 6"/>
+          <p:cNvSpPr>
+            <a:spLocks noGrp="1"/>
+          </p:cNvSpPr>
+          <p:nvPr>
+            <p:ph type="title"/>
+          </p:nvPr>
+        </p:nvSpPr>
+        <p:spPr/>
+        <p:txBody>
+          <a:bodyPr/>
+          <a:lstStyle/>
+          <a:p>
+            <a:endParaRPr lang="ko-KR" altLang="en-US"/>
+          </a:p>
+        </p:txBody>
+      </p:sp>
+      <p:sp>
+        <p:nvSpPr>
           <p:cNvPr id="2" name="날짜 개체 틀 1"/>
           <p:cNvSpPr>
             <a:spLocks noGrp="1"/>
@@ -3513,7 +3442,7 @@
           <a:lstStyle/>
           <a:p>
             <a:r>
-              <a:rPr lang="en-US" altLang="ko-KR" smtClean="0"/>
+              <a:rPr lang="en-US" altLang="ko-KR"/>
               <a:t>2017</a:t>
             </a:r>
             <a:endParaRPr lang="ko-KR" altLang="en-US" dirty="0"/>
@@ -3536,11 +3465,11 @@
           <a:lstStyle/>
           <a:p>
             <a:r>
-              <a:rPr lang="en-US" altLang="ko-KR" smtClean="0"/>
+              <a:rPr lang="en-US" altLang="ko-KR"/>
               <a:t>C#</a:t>
             </a:r>
             <a:r>
-              <a:rPr lang="ko-KR" altLang="en-US" smtClean="0"/>
+              <a:rPr lang="ko-KR" altLang="en-US"/>
               <a:t>으로 클리커 게임 만들기</a:t>
             </a:r>
             <a:endParaRPr lang="ko-KR" altLang="en-US" dirty="0"/>
@@ -3590,42 +3519,16 @@
           </a:p>
         </p:txBody>
       </p:sp>
-      <p:sp>
-        <p:nvSpPr>
-          <p:cNvPr id="7" name="제목 6"/>
-          <p:cNvSpPr>
-            <a:spLocks noGrp="1"/>
-          </p:cNvSpPr>
-          <p:nvPr>
-            <p:ph type="title"/>
-          </p:nvPr>
-        </p:nvSpPr>
-        <p:spPr/>
-        <p:txBody>
-          <a:bodyPr/>
-          <a:lstStyle/>
-          <a:p>
-            <a:endParaRPr lang="ko-KR" altLang="en-US"/>
-          </a:p>
-        </p:txBody>
-      </p:sp>
     </p:spTree>
     <p:extLst>
       <p:ext uri="{BB962C8B-B14F-4D97-AF65-F5344CB8AC3E}">
-        <p14:creationId xmlns:p14="http://schemas.microsoft.com/office/powerpoint/2010/main" val="378587793"/>
+        <p14:creationId xmlns:p14="http://schemas.microsoft.com/office/powerpoint/2010/main" val="1354311593"/>
       </p:ext>
     </p:extLst>
   </p:cSld>
   <p:clrMapOvr>
     <a:masterClrMapping/>
   </p:clrMapOvr>
-  <p:timing>
-    <p:tnLst>
-      <p:par>
-        <p:cTn id="1" dur="indefinite" restart="never" nodeType="tmRoot"/>
-      </p:par>
-    </p:tnLst>
-  </p:timing>
 </p:sld>
 </file>
 
@@ -3648,12 +3551,12 @@
       </p:grpSpPr>
       <p:sp>
         <p:nvSpPr>
-          <p:cNvPr id="7" name="제목 6"/>
-          <p:cNvSpPr>
-            <a:spLocks noGrp="1"/>
-          </p:cNvSpPr>
-          <p:nvPr>
-            <p:ph type="title"/>
+          <p:cNvPr id="2" name="날짜 개체 틀 1"/>
+          <p:cNvSpPr>
+            <a:spLocks noGrp="1"/>
+          </p:cNvSpPr>
+          <p:nvPr>
+            <p:ph type="dt" sz="half" idx="10"/>
           </p:nvPr>
         </p:nvSpPr>
         <p:spPr/>
@@ -3661,18 +3564,22 @@
           <a:bodyPr/>
           <a:lstStyle/>
           <a:p>
-            <a:endParaRPr lang="ko-KR" altLang="en-US"/>
-          </a:p>
-        </p:txBody>
-      </p:sp>
-      <p:sp>
-        <p:nvSpPr>
-          <p:cNvPr id="2" name="날짜 개체 틀 1"/>
-          <p:cNvSpPr>
-            <a:spLocks noGrp="1"/>
-          </p:cNvSpPr>
-          <p:nvPr>
-            <p:ph type="dt" sz="half" idx="10"/>
+            <a:r>
+              <a:rPr lang="en-US" altLang="ko-KR"/>
+              <a:t>2017</a:t>
+            </a:r>
+            <a:endParaRPr lang="ko-KR" altLang="en-US" dirty="0"/>
+          </a:p>
+        </p:txBody>
+      </p:sp>
+      <p:sp>
+        <p:nvSpPr>
+          <p:cNvPr id="3" name="바닥글 개체 틀 2"/>
+          <p:cNvSpPr>
+            <a:spLocks noGrp="1"/>
+          </p:cNvSpPr>
+          <p:nvPr>
+            <p:ph type="ftr" sz="quarter" idx="11"/>
           </p:nvPr>
         </p:nvSpPr>
         <p:spPr/>
@@ -3681,34 +3588,11 @@
           <a:lstStyle/>
           <a:p>
             <a:r>
-              <a:rPr lang="en-US" altLang="ko-KR" smtClean="0"/>
-              <a:t>2017</a:t>
-            </a:r>
-            <a:endParaRPr lang="ko-KR" altLang="en-US" dirty="0"/>
-          </a:p>
-        </p:txBody>
-      </p:sp>
-      <p:sp>
-        <p:nvSpPr>
-          <p:cNvPr id="3" name="바닥글 개체 틀 2"/>
-          <p:cNvSpPr>
-            <a:spLocks noGrp="1"/>
-          </p:cNvSpPr>
-          <p:nvPr>
-            <p:ph type="ftr" sz="quarter" idx="11"/>
-          </p:nvPr>
-        </p:nvSpPr>
-        <p:spPr/>
-        <p:txBody>
-          <a:bodyPr/>
-          <a:lstStyle/>
-          <a:p>
-            <a:r>
-              <a:rPr lang="en-US" altLang="ko-KR" smtClean="0"/>
+              <a:rPr lang="en-US" altLang="ko-KR"/>
               <a:t>C#</a:t>
             </a:r>
             <a:r>
-              <a:rPr lang="ko-KR" altLang="en-US" smtClean="0"/>
+              <a:rPr lang="ko-KR" altLang="en-US"/>
               <a:t>으로 클리커 게임 만들기</a:t>
             </a:r>
             <a:endParaRPr lang="ko-KR" altLang="en-US" dirty="0"/>
@@ -3758,23 +3642,35 @@
           </a:p>
         </p:txBody>
       </p:sp>
+      <p:sp>
+        <p:nvSpPr>
+          <p:cNvPr id="7" name="제목 6"/>
+          <p:cNvSpPr>
+            <a:spLocks noGrp="1"/>
+          </p:cNvSpPr>
+          <p:nvPr>
+            <p:ph type="title"/>
+          </p:nvPr>
+        </p:nvSpPr>
+        <p:spPr/>
+        <p:txBody>
+          <a:bodyPr/>
+          <a:lstStyle/>
+          <a:p>
+            <a:endParaRPr lang="ko-KR" altLang="en-US" dirty="0"/>
+          </a:p>
+        </p:txBody>
+      </p:sp>
     </p:spTree>
     <p:extLst>
       <p:ext uri="{BB962C8B-B14F-4D97-AF65-F5344CB8AC3E}">
-        <p14:creationId xmlns:p14="http://schemas.microsoft.com/office/powerpoint/2010/main" val="1354311593"/>
+        <p14:creationId xmlns:p14="http://schemas.microsoft.com/office/powerpoint/2010/main" val="378587793"/>
       </p:ext>
     </p:extLst>
   </p:cSld>
   <p:clrMapOvr>
     <a:masterClrMapping/>
   </p:clrMapOvr>
-  <p:timing>
-    <p:tnLst>
-      <p:par>
-        <p:cTn id="1" dur="indefinite" restart="never" nodeType="tmRoot"/>
-      </p:par>
-    </p:tnLst>
-  </p:timing>
 </p:sld>
 </file>
 
@@ -3811,7 +3707,7 @@
           <a:lstStyle/>
           <a:p>
             <a:r>
-              <a:rPr lang="en-US" altLang="ko-KR" smtClean="0"/>
+              <a:rPr lang="en-US" altLang="ko-KR"/>
               <a:t>2017</a:t>
             </a:r>
             <a:endParaRPr lang="ko-KR" altLang="en-US" dirty="0"/>
@@ -3834,11 +3730,11 @@
           <a:lstStyle/>
           <a:p>
             <a:r>
-              <a:rPr lang="en-US" altLang="ko-KR" smtClean="0"/>
+              <a:rPr lang="en-US" altLang="ko-KR"/>
               <a:t>C#</a:t>
             </a:r>
             <a:r>
-              <a:rPr lang="ko-KR" altLang="en-US" smtClean="0"/>
+              <a:rPr lang="ko-KR" altLang="en-US"/>
               <a:t>으로 클리커 게임 만들기</a:t>
             </a:r>
             <a:endParaRPr lang="ko-KR" altLang="en-US" dirty="0"/>
@@ -3917,13 +3813,6 @@
   <p:clrMapOvr>
     <a:masterClrMapping/>
   </p:clrMapOvr>
-  <p:timing>
-    <p:tnLst>
-      <p:par>
-        <p:cTn id="1" dur="indefinite" restart="never" nodeType="tmRoot"/>
-      </p:par>
-    </p:tnLst>
-  </p:timing>
 </p:sld>
 </file>
 
@@ -3960,7 +3849,7 @@
           <a:lstStyle/>
           <a:p>
             <a:r>
-              <a:rPr lang="en-US" altLang="ko-KR" smtClean="0"/>
+              <a:rPr lang="en-US" altLang="ko-KR"/>
               <a:t>2017</a:t>
             </a:r>
             <a:endParaRPr lang="ko-KR" altLang="en-US" dirty="0"/>
@@ -3983,11 +3872,11 @@
           <a:lstStyle/>
           <a:p>
             <a:r>
-              <a:rPr lang="en-US" altLang="ko-KR" smtClean="0"/>
+              <a:rPr lang="en-US" altLang="ko-KR"/>
               <a:t>C#</a:t>
             </a:r>
             <a:r>
-              <a:rPr lang="ko-KR" altLang="en-US" smtClean="0"/>
+              <a:rPr lang="ko-KR" altLang="en-US"/>
               <a:t>으로 클리커 게임 만들기</a:t>
             </a:r>
             <a:endParaRPr lang="ko-KR" altLang="en-US" dirty="0"/>
@@ -4028,13 +3917,6 @@
   <p:clrMapOvr>
     <a:masterClrMapping/>
   </p:clrMapOvr>
-  <p:timing>
-    <p:tnLst>
-      <p:par>
-        <p:cTn id="1" dur="indefinite" restart="never" nodeType="tmRoot"/>
-      </p:par>
-    </p:tnLst>
-  </p:timing>
 </p:sld>
 </file>
 

</xml_diff>